<commit_message>
add mvc framework slides
</commit_message>
<xml_diff>
--- a/powerpoints/2_J2EE.pptx
+++ b/powerpoints/2_J2EE.pptx
@@ -5,24 +5,21 @@
     <p:sldMasterId id="2147483660" r:id="rId1"/>
   </p:sldMasterIdLst>
   <p:notesMasterIdLst>
-    <p:notesMasterId r:id="rId17"/>
+    <p:notesMasterId r:id="rId14"/>
   </p:notesMasterIdLst>
   <p:sldIdLst>
     <p:sldId id="256" r:id="rId2"/>
     <p:sldId id="257" r:id="rId3"/>
     <p:sldId id="261" r:id="rId4"/>
     <p:sldId id="262" r:id="rId5"/>
-    <p:sldId id="263" r:id="rId6"/>
-    <p:sldId id="264" r:id="rId7"/>
+    <p:sldId id="264" r:id="rId6"/>
+    <p:sldId id="273" r:id="rId7"/>
     <p:sldId id="259" r:id="rId8"/>
     <p:sldId id="272" r:id="rId9"/>
-    <p:sldId id="270" r:id="rId10"/>
-    <p:sldId id="265" r:id="rId11"/>
+    <p:sldId id="265" r:id="rId10"/>
+    <p:sldId id="274" r:id="rId11"/>
     <p:sldId id="266" r:id="rId12"/>
-    <p:sldId id="260" r:id="rId13"/>
-    <p:sldId id="267" r:id="rId14"/>
-    <p:sldId id="269" r:id="rId15"/>
-    <p:sldId id="271" r:id="rId16"/>
+    <p:sldId id="271" r:id="rId13"/>
   </p:sldIdLst>
   <p:sldSz cx="12192000" cy="6858000"/>
   <p:notesSz cx="6858000" cy="9144000"/>
@@ -211,7 +208,7 @@
           <a:p>
             <a:fld id="{0EF7D67E-4B58-4045-9D7A-2A3146F2289B}" type="datetimeFigureOut">
               <a:rPr lang="en-US" smtClean="0"/>
-              <a:t>5/9/2019</a:t>
+              <a:t>5/13/2019</a:t>
             </a:fld>
             <a:endParaRPr lang="en-US"/>
           </a:p>
@@ -562,258 +559,6 @@
 </p:notes>
 </file>
 
-<file path=ppt/notesSlides/notesSlide10.xml><?xml version="1.0" encoding="utf-8"?>
-<p:notes xmlns:a="http://schemas.openxmlformats.org/drawingml/2006/main" xmlns:r="http://schemas.openxmlformats.org/officeDocument/2006/relationships" xmlns:p="http://schemas.openxmlformats.org/presentationml/2006/main">
-  <p:cSld>
-    <p:spTree>
-      <p:nvGrpSpPr>
-        <p:cNvPr id="1" name=""/>
-        <p:cNvGrpSpPr/>
-        <p:nvPr/>
-      </p:nvGrpSpPr>
-      <p:grpSpPr>
-        <a:xfrm>
-          <a:off x="0" y="0"/>
-          <a:ext cx="0" cy="0"/>
-          <a:chOff x="0" y="0"/>
-          <a:chExt cx="0" cy="0"/>
-        </a:xfrm>
-      </p:grpSpPr>
-      <p:sp>
-        <p:nvSpPr>
-          <p:cNvPr id="2" name="Slide Image Placeholder 1"/>
-          <p:cNvSpPr>
-            <a:spLocks noGrp="1" noRot="1" noChangeAspect="1"/>
-          </p:cNvSpPr>
-          <p:nvPr>
-            <p:ph type="sldImg"/>
-          </p:nvPr>
-        </p:nvSpPr>
-        <p:spPr/>
-      </p:sp>
-      <p:sp>
-        <p:nvSpPr>
-          <p:cNvPr id="3" name="Notes Placeholder 2"/>
-          <p:cNvSpPr>
-            <a:spLocks noGrp="1"/>
-          </p:cNvSpPr>
-          <p:nvPr>
-            <p:ph type="body" idx="1"/>
-          </p:nvPr>
-        </p:nvSpPr>
-        <p:spPr/>
-        <p:txBody>
-          <a:bodyPr/>
-          <a:lstStyle/>
-          <a:p>
-            <a:endParaRPr lang="en-US" dirty="0"/>
-          </a:p>
-        </p:txBody>
-      </p:sp>
-      <p:sp>
-        <p:nvSpPr>
-          <p:cNvPr id="4" name="Slide Number Placeholder 3"/>
-          <p:cNvSpPr>
-            <a:spLocks noGrp="1"/>
-          </p:cNvSpPr>
-          <p:nvPr>
-            <p:ph type="sldNum" sz="quarter" idx="5"/>
-          </p:nvPr>
-        </p:nvSpPr>
-        <p:spPr/>
-        <p:txBody>
-          <a:bodyPr/>
-          <a:lstStyle/>
-          <a:p>
-            <a:fld id="{AD4AE8B2-994A-4552-9CCE-37BF2DC10FAC}" type="slidenum">
-              <a:rPr lang="en-US" smtClean="0"/>
-              <a:t>12</a:t>
-            </a:fld>
-            <a:endParaRPr lang="en-US"/>
-          </a:p>
-        </p:txBody>
-      </p:sp>
-    </p:spTree>
-    <p:extLst>
-      <p:ext uri="{BB962C8B-B14F-4D97-AF65-F5344CB8AC3E}">
-        <p14:creationId xmlns:p14="http://schemas.microsoft.com/office/powerpoint/2010/main" val="395256386"/>
-      </p:ext>
-    </p:extLst>
-  </p:cSld>
-  <p:clrMapOvr>
-    <a:masterClrMapping/>
-  </p:clrMapOvr>
-</p:notes>
-</file>
-
-<file path=ppt/notesSlides/notesSlide11.xml><?xml version="1.0" encoding="utf-8"?>
-<p:notes xmlns:a="http://schemas.openxmlformats.org/drawingml/2006/main" xmlns:r="http://schemas.openxmlformats.org/officeDocument/2006/relationships" xmlns:p="http://schemas.openxmlformats.org/presentationml/2006/main">
-  <p:cSld>
-    <p:spTree>
-      <p:nvGrpSpPr>
-        <p:cNvPr id="1" name=""/>
-        <p:cNvGrpSpPr/>
-        <p:nvPr/>
-      </p:nvGrpSpPr>
-      <p:grpSpPr>
-        <a:xfrm>
-          <a:off x="0" y="0"/>
-          <a:ext cx="0" cy="0"/>
-          <a:chOff x="0" y="0"/>
-          <a:chExt cx="0" cy="0"/>
-        </a:xfrm>
-      </p:grpSpPr>
-      <p:sp>
-        <p:nvSpPr>
-          <p:cNvPr id="2" name="Slide Image Placeholder 1"/>
-          <p:cNvSpPr>
-            <a:spLocks noGrp="1" noRot="1" noChangeAspect="1"/>
-          </p:cNvSpPr>
-          <p:nvPr>
-            <p:ph type="sldImg"/>
-          </p:nvPr>
-        </p:nvSpPr>
-        <p:spPr/>
-      </p:sp>
-      <p:sp>
-        <p:nvSpPr>
-          <p:cNvPr id="3" name="Notes Placeholder 2"/>
-          <p:cNvSpPr>
-            <a:spLocks noGrp="1"/>
-          </p:cNvSpPr>
-          <p:nvPr>
-            <p:ph type="body" idx="1"/>
-          </p:nvPr>
-        </p:nvSpPr>
-        <p:spPr/>
-        <p:txBody>
-          <a:bodyPr/>
-          <a:lstStyle/>
-          <a:p>
-            <a:endParaRPr lang="en-US" dirty="0"/>
-          </a:p>
-        </p:txBody>
-      </p:sp>
-      <p:sp>
-        <p:nvSpPr>
-          <p:cNvPr id="4" name="Slide Number Placeholder 3"/>
-          <p:cNvSpPr>
-            <a:spLocks noGrp="1"/>
-          </p:cNvSpPr>
-          <p:nvPr>
-            <p:ph type="sldNum" sz="quarter" idx="5"/>
-          </p:nvPr>
-        </p:nvSpPr>
-        <p:spPr/>
-        <p:txBody>
-          <a:bodyPr/>
-          <a:lstStyle/>
-          <a:p>
-            <a:fld id="{AD4AE8B2-994A-4552-9CCE-37BF2DC10FAC}" type="slidenum">
-              <a:rPr lang="en-US" smtClean="0"/>
-              <a:t>13</a:t>
-            </a:fld>
-            <a:endParaRPr lang="en-US"/>
-          </a:p>
-        </p:txBody>
-      </p:sp>
-    </p:spTree>
-    <p:extLst>
-      <p:ext uri="{BB962C8B-B14F-4D97-AF65-F5344CB8AC3E}">
-        <p14:creationId xmlns:p14="http://schemas.microsoft.com/office/powerpoint/2010/main" val="359132587"/>
-      </p:ext>
-    </p:extLst>
-  </p:cSld>
-  <p:clrMapOvr>
-    <a:masterClrMapping/>
-  </p:clrMapOvr>
-</p:notes>
-</file>
-
-<file path=ppt/notesSlides/notesSlide12.xml><?xml version="1.0" encoding="utf-8"?>
-<p:notes xmlns:a="http://schemas.openxmlformats.org/drawingml/2006/main" xmlns:r="http://schemas.openxmlformats.org/officeDocument/2006/relationships" xmlns:p="http://schemas.openxmlformats.org/presentationml/2006/main">
-  <p:cSld>
-    <p:spTree>
-      <p:nvGrpSpPr>
-        <p:cNvPr id="1" name=""/>
-        <p:cNvGrpSpPr/>
-        <p:nvPr/>
-      </p:nvGrpSpPr>
-      <p:grpSpPr>
-        <a:xfrm>
-          <a:off x="0" y="0"/>
-          <a:ext cx="0" cy="0"/>
-          <a:chOff x="0" y="0"/>
-          <a:chExt cx="0" cy="0"/>
-        </a:xfrm>
-      </p:grpSpPr>
-      <p:sp>
-        <p:nvSpPr>
-          <p:cNvPr id="2" name="Slide Image Placeholder 1"/>
-          <p:cNvSpPr>
-            <a:spLocks noGrp="1" noRot="1" noChangeAspect="1"/>
-          </p:cNvSpPr>
-          <p:nvPr>
-            <p:ph type="sldImg"/>
-          </p:nvPr>
-        </p:nvSpPr>
-        <p:spPr/>
-      </p:sp>
-      <p:sp>
-        <p:nvSpPr>
-          <p:cNvPr id="3" name="Notes Placeholder 2"/>
-          <p:cNvSpPr>
-            <a:spLocks noGrp="1"/>
-          </p:cNvSpPr>
-          <p:nvPr>
-            <p:ph type="body" idx="1"/>
-          </p:nvPr>
-        </p:nvSpPr>
-        <p:spPr/>
-        <p:txBody>
-          <a:bodyPr/>
-          <a:lstStyle/>
-          <a:p>
-            <a:endParaRPr lang="en-US" dirty="0"/>
-          </a:p>
-        </p:txBody>
-      </p:sp>
-      <p:sp>
-        <p:nvSpPr>
-          <p:cNvPr id="4" name="Slide Number Placeholder 3"/>
-          <p:cNvSpPr>
-            <a:spLocks noGrp="1"/>
-          </p:cNvSpPr>
-          <p:nvPr>
-            <p:ph type="sldNum" sz="quarter" idx="5"/>
-          </p:nvPr>
-        </p:nvSpPr>
-        <p:spPr/>
-        <p:txBody>
-          <a:bodyPr/>
-          <a:lstStyle/>
-          <a:p>
-            <a:fld id="{AD4AE8B2-994A-4552-9CCE-37BF2DC10FAC}" type="slidenum">
-              <a:rPr lang="en-US" smtClean="0"/>
-              <a:t>14</a:t>
-            </a:fld>
-            <a:endParaRPr lang="en-US"/>
-          </a:p>
-        </p:txBody>
-      </p:sp>
-    </p:spTree>
-    <p:extLst>
-      <p:ext uri="{BB962C8B-B14F-4D97-AF65-F5344CB8AC3E}">
-        <p14:creationId xmlns:p14="http://schemas.microsoft.com/office/powerpoint/2010/main" val="4119004336"/>
-      </p:ext>
-    </p:extLst>
-  </p:cSld>
-  <p:clrMapOvr>
-    <a:masterClrMapping/>
-  </p:clrMapOvr>
-</p:notes>
-</file>
-
 <file path=ppt/notesSlides/notesSlide2.xml><?xml version="1.0" encoding="utf-8"?>
 <p:notes xmlns:a="http://schemas.openxmlformats.org/drawingml/2006/main" xmlns:r="http://schemas.openxmlformats.org/officeDocument/2006/relationships" xmlns:p="http://schemas.openxmlformats.org/presentationml/2006/main">
   <p:cSld>
@@ -1068,7 +813,7 @@
     </p:spTree>
     <p:extLst>
       <p:ext uri="{BB962C8B-B14F-4D97-AF65-F5344CB8AC3E}">
-        <p14:creationId xmlns:p14="http://schemas.microsoft.com/office/powerpoint/2010/main" val="4238427201"/>
+        <p14:creationId xmlns:p14="http://schemas.microsoft.com/office/powerpoint/2010/main" val="1709870944"/>
       </p:ext>
     </p:extLst>
   </p:cSld>
@@ -1152,7 +897,7 @@
     </p:spTree>
     <p:extLst>
       <p:ext uri="{BB962C8B-B14F-4D97-AF65-F5344CB8AC3E}">
-        <p14:creationId xmlns:p14="http://schemas.microsoft.com/office/powerpoint/2010/main" val="1709870944"/>
+        <p14:creationId xmlns:p14="http://schemas.microsoft.com/office/powerpoint/2010/main" val="94796177"/>
       </p:ext>
     </p:extLst>
   </p:cSld>
@@ -1404,7 +1149,7 @@
     </p:spTree>
     <p:extLst>
       <p:ext uri="{BB962C8B-B14F-4D97-AF65-F5344CB8AC3E}">
-        <p14:creationId xmlns:p14="http://schemas.microsoft.com/office/powerpoint/2010/main" val="3833158687"/>
+        <p14:creationId xmlns:p14="http://schemas.microsoft.com/office/powerpoint/2010/main" val="346165463"/>
       </p:ext>
     </p:extLst>
   </p:cSld>
@@ -2220,7 +1965,7 @@
           <a:p>
             <a:fld id="{0750AAB1-FE9E-4196-BD41-09EE7BF1C401}" type="datetimeFigureOut">
               <a:rPr lang="en-US" smtClean="0"/>
-              <a:t>5/9/2019</a:t>
+              <a:t>5/13/2019</a:t>
             </a:fld>
             <a:endParaRPr lang="en-US"/>
           </a:p>
@@ -2471,7 +2216,7 @@
           <a:p>
             <a:fld id="{0750AAB1-FE9E-4196-BD41-09EE7BF1C401}" type="datetimeFigureOut">
               <a:rPr lang="en-US" smtClean="0"/>
-              <a:t>5/9/2019</a:t>
+              <a:t>5/13/2019</a:t>
             </a:fld>
             <a:endParaRPr lang="en-US"/>
           </a:p>
@@ -2785,7 +2530,7 @@
           <a:p>
             <a:fld id="{0750AAB1-FE9E-4196-BD41-09EE7BF1C401}" type="datetimeFigureOut">
               <a:rPr lang="en-US" smtClean="0"/>
-              <a:t>5/9/2019</a:t>
+              <a:t>5/13/2019</a:t>
             </a:fld>
             <a:endParaRPr lang="en-US"/>
           </a:p>
@@ -3126,7 +2871,7 @@
           <a:p>
             <a:fld id="{0750AAB1-FE9E-4196-BD41-09EE7BF1C401}" type="datetimeFigureOut">
               <a:rPr lang="en-US" smtClean="0"/>
-              <a:t>5/9/2019</a:t>
+              <a:t>5/13/2019</a:t>
             </a:fld>
             <a:endParaRPr lang="en-US"/>
           </a:p>
@@ -3440,7 +3185,7 @@
           <a:p>
             <a:fld id="{0750AAB1-FE9E-4196-BD41-09EE7BF1C401}" type="datetimeFigureOut">
               <a:rPr lang="en-US" smtClean="0"/>
-              <a:t>5/9/2019</a:t>
+              <a:t>5/13/2019</a:t>
             </a:fld>
             <a:endParaRPr lang="en-US"/>
           </a:p>
@@ -3833,7 +3578,7 @@
           <a:p>
             <a:fld id="{0750AAB1-FE9E-4196-BD41-09EE7BF1C401}" type="datetimeFigureOut">
               <a:rPr lang="en-US" smtClean="0"/>
-              <a:t>5/9/2019</a:t>
+              <a:t>5/13/2019</a:t>
             </a:fld>
             <a:endParaRPr lang="en-US"/>
           </a:p>
@@ -4003,7 +3748,7 @@
           <a:p>
             <a:fld id="{0750AAB1-FE9E-4196-BD41-09EE7BF1C401}" type="datetimeFigureOut">
               <a:rPr lang="en-US" smtClean="0"/>
-              <a:t>5/9/2019</a:t>
+              <a:t>5/13/2019</a:t>
             </a:fld>
             <a:endParaRPr lang="en-US"/>
           </a:p>
@@ -4183,7 +3928,7 @@
           <a:p>
             <a:fld id="{0750AAB1-FE9E-4196-BD41-09EE7BF1C401}" type="datetimeFigureOut">
               <a:rPr lang="en-US" smtClean="0"/>
-              <a:t>5/9/2019</a:t>
+              <a:t>5/13/2019</a:t>
             </a:fld>
             <a:endParaRPr lang="en-US"/>
           </a:p>
@@ -4359,7 +4104,7 @@
           <a:p>
             <a:fld id="{0750AAB1-FE9E-4196-BD41-09EE7BF1C401}" type="datetimeFigureOut">
               <a:rPr lang="en-US" smtClean="0"/>
-              <a:t>5/9/2019</a:t>
+              <a:t>5/13/2019</a:t>
             </a:fld>
             <a:endParaRPr lang="en-US"/>
           </a:p>
@@ -4606,7 +4351,7 @@
           <a:p>
             <a:fld id="{0750AAB1-FE9E-4196-BD41-09EE7BF1C401}" type="datetimeFigureOut">
               <a:rPr lang="en-US" smtClean="0"/>
-              <a:t>5/9/2019</a:t>
+              <a:t>5/13/2019</a:t>
             </a:fld>
             <a:endParaRPr lang="en-US"/>
           </a:p>
@@ -4838,7 +4583,7 @@
           <a:p>
             <a:fld id="{0750AAB1-FE9E-4196-BD41-09EE7BF1C401}" type="datetimeFigureOut">
               <a:rPr lang="en-US" smtClean="0"/>
-              <a:t>5/9/2019</a:t>
+              <a:t>5/13/2019</a:t>
             </a:fld>
             <a:endParaRPr lang="en-US"/>
           </a:p>
@@ -5212,7 +4957,7 @@
           <a:p>
             <a:fld id="{0750AAB1-FE9E-4196-BD41-09EE7BF1C401}" type="datetimeFigureOut">
               <a:rPr lang="en-US" smtClean="0"/>
-              <a:t>5/9/2019</a:t>
+              <a:t>5/13/2019</a:t>
             </a:fld>
             <a:endParaRPr lang="en-US"/>
           </a:p>
@@ -5335,7 +5080,7 @@
           <a:p>
             <a:fld id="{0750AAB1-FE9E-4196-BD41-09EE7BF1C401}" type="datetimeFigureOut">
               <a:rPr lang="en-US" smtClean="0"/>
-              <a:t>5/9/2019</a:t>
+              <a:t>5/13/2019</a:t>
             </a:fld>
             <a:endParaRPr lang="en-US"/>
           </a:p>
@@ -5430,7 +5175,7 @@
           <a:p>
             <a:fld id="{0750AAB1-FE9E-4196-BD41-09EE7BF1C401}" type="datetimeFigureOut">
               <a:rPr lang="en-US" smtClean="0"/>
-              <a:t>5/9/2019</a:t>
+              <a:t>5/13/2019</a:t>
             </a:fld>
             <a:endParaRPr lang="en-US"/>
           </a:p>
@@ -5685,7 +5430,7 @@
           <a:p>
             <a:fld id="{0750AAB1-FE9E-4196-BD41-09EE7BF1C401}" type="datetimeFigureOut">
               <a:rPr lang="en-US" smtClean="0"/>
-              <a:t>5/9/2019</a:t>
+              <a:t>5/13/2019</a:t>
             </a:fld>
             <a:endParaRPr lang="en-US"/>
           </a:p>
@@ -5948,7 +5693,7 @@
           <a:p>
             <a:fld id="{0750AAB1-FE9E-4196-BD41-09EE7BF1C401}" type="datetimeFigureOut">
               <a:rPr lang="en-US" smtClean="0"/>
-              <a:t>5/9/2019</a:t>
+              <a:t>5/13/2019</a:t>
             </a:fld>
             <a:endParaRPr lang="en-US"/>
           </a:p>
@@ -6691,7 +6436,7 @@
           <a:p>
             <a:fld id="{0750AAB1-FE9E-4196-BD41-09EE7BF1C401}" type="datetimeFigureOut">
               <a:rPr lang="en-US" smtClean="0"/>
-              <a:t>5/9/2019</a:t>
+              <a:t>5/13/2019</a:t>
             </a:fld>
             <a:endParaRPr lang="en-US"/>
           </a:p>
@@ -7306,7 +7051,7 @@
           <p:cNvPr id="2" name="Title 1">
             <a:extLst>
               <a:ext uri="{FF2B5EF4-FFF2-40B4-BE49-F238E27FC236}">
-                <a16:creationId xmlns:a16="http://schemas.microsoft.com/office/drawing/2014/main" id="{854F950B-AEEC-4409-A257-6294E5A431FF}"/>
+                <a16:creationId xmlns:a16="http://schemas.microsoft.com/office/drawing/2014/main" id="{33E3006C-5BC7-4901-8E66-22CDD0F9811A}"/>
               </a:ext>
             </a:extLst>
           </p:cNvPr>
@@ -7317,19 +7062,14 @@
             <p:ph type="title"/>
           </p:nvPr>
         </p:nvSpPr>
-        <p:spPr>
-          <a:xfrm>
-            <a:off x="677334" y="609600"/>
-            <a:ext cx="8596668" cy="739140"/>
-          </a:xfrm>
-        </p:spPr>
+        <p:spPr/>
         <p:txBody>
           <a:bodyPr/>
           <a:lstStyle/>
           <a:p>
             <a:r>
               <a:rPr lang="en-US" dirty="0"/>
-              <a:t>Git rebase vs merge</a:t>
+              <a:t>Maven</a:t>
             </a:r>
           </a:p>
         </p:txBody>
@@ -7339,7 +7079,7 @@
           <p:cNvPr id="3" name="Content Placeholder 2">
             <a:extLst>
               <a:ext uri="{FF2B5EF4-FFF2-40B4-BE49-F238E27FC236}">
-                <a16:creationId xmlns:a16="http://schemas.microsoft.com/office/drawing/2014/main" id="{04F20373-0BFF-4C35-8463-E52FFE3EA21D}"/>
+                <a16:creationId xmlns:a16="http://schemas.microsoft.com/office/drawing/2014/main" id="{C0E6969F-5A5E-47CF-B78F-AA2F2B9B9025}"/>
               </a:ext>
             </a:extLst>
           </p:cNvPr>
@@ -7350,93 +7090,40 @@
             <p:ph idx="1"/>
           </p:nvPr>
         </p:nvSpPr>
-        <p:spPr>
-          <a:xfrm>
-            <a:off x="677334" y="1440181"/>
-            <a:ext cx="2477346" cy="400049"/>
-          </a:xfrm>
-        </p:spPr>
+        <p:spPr/>
         <p:txBody>
           <a:bodyPr/>
           <a:lstStyle/>
           <a:p>
             <a:r>
               <a:rPr lang="en-US" dirty="0"/>
-              <a:t>Git rebase, merge</a:t>
-            </a:r>
-          </a:p>
-          <a:p>
-            <a:pPr marL="0" indent="0">
-              <a:buNone/>
-            </a:pPr>
-            <a:endParaRPr lang="en-US" dirty="0"/>
-          </a:p>
-        </p:txBody>
-      </p:sp>
-      <p:pic>
-        <p:nvPicPr>
-          <p:cNvPr id="8" name="Picture 7">
-            <a:extLst>
-              <a:ext uri="{FF2B5EF4-FFF2-40B4-BE49-F238E27FC236}">
-                <a16:creationId xmlns:a16="http://schemas.microsoft.com/office/drawing/2014/main" id="{820A64B0-9790-406F-BEE3-ECF4571380B1}"/>
-              </a:ext>
-            </a:extLst>
-          </p:cNvPr>
-          <p:cNvPicPr>
-            <a:picLocks noChangeAspect="1"/>
-          </p:cNvPicPr>
-          <p:nvPr/>
-        </p:nvPicPr>
-        <p:blipFill>
-          <a:blip r:embed="rId2"/>
-          <a:stretch>
-            <a:fillRect/>
-          </a:stretch>
-        </p:blipFill>
-        <p:spPr>
-          <a:xfrm>
-            <a:off x="677334" y="2394692"/>
-            <a:ext cx="3604260" cy="3597485"/>
-          </a:xfrm>
-          <a:prstGeom prst="rect">
-            <a:avLst/>
-          </a:prstGeom>
-        </p:spPr>
-      </p:pic>
-      <p:pic>
-        <p:nvPicPr>
-          <p:cNvPr id="9" name="Picture 8">
-            <a:extLst>
-              <a:ext uri="{FF2B5EF4-FFF2-40B4-BE49-F238E27FC236}">
-                <a16:creationId xmlns:a16="http://schemas.microsoft.com/office/drawing/2014/main" id="{631A167A-0CA9-4C4A-A56F-0E52B5934905}"/>
-              </a:ext>
-            </a:extLst>
-          </p:cNvPr>
-          <p:cNvPicPr>
-            <a:picLocks noChangeAspect="1"/>
-          </p:cNvPicPr>
-          <p:nvPr/>
-        </p:nvPicPr>
-        <p:blipFill>
-          <a:blip r:embed="rId3"/>
-          <a:stretch>
-            <a:fillRect/>
-          </a:stretch>
-        </p:blipFill>
-        <p:spPr>
-          <a:xfrm>
-            <a:off x="6721302" y="2394692"/>
-            <a:ext cx="1884724" cy="3597485"/>
-          </a:xfrm>
-          <a:prstGeom prst="rect">
-            <a:avLst/>
-          </a:prstGeom>
-        </p:spPr>
-      </p:pic>
+              <a:t>Maven – Dependency Management</a:t>
+            </a:r>
+          </a:p>
+          <a:p>
+            <a:r>
+              <a:rPr lang="en-US" dirty="0"/>
+              <a:t>Local vs Remote repository</a:t>
+            </a:r>
+          </a:p>
+          <a:p>
+            <a:r>
+              <a:rPr lang="en-US" dirty="0"/>
+              <a:t>Snapshot</a:t>
+            </a:r>
+          </a:p>
+          <a:p>
+            <a:r>
+              <a:rPr lang="en-US" dirty="0"/>
+              <a:t>Maven Clean, Build, Package, Test, Install</a:t>
+            </a:r>
+          </a:p>
+        </p:txBody>
+      </p:sp>
     </p:spTree>
     <p:extLst>
       <p:ext uri="{BB962C8B-B14F-4D97-AF65-F5344CB8AC3E}">
-        <p14:creationId xmlns:p14="http://schemas.microsoft.com/office/powerpoint/2010/main" val="3559644683"/>
+        <p14:creationId xmlns:p14="http://schemas.microsoft.com/office/powerpoint/2010/main" val="2093771640"/>
       </p:ext>
     </p:extLst>
   </p:cSld>
@@ -7578,389 +7265,6 @@
           <p:cNvPr id="2" name="Title 1">
             <a:extLst>
               <a:ext uri="{FF2B5EF4-FFF2-40B4-BE49-F238E27FC236}">
-                <a16:creationId xmlns:a16="http://schemas.microsoft.com/office/drawing/2014/main" id="{57AB5A4D-DAF8-4C96-B052-56E4C1FC4318}"/>
-              </a:ext>
-            </a:extLst>
-          </p:cNvPr>
-          <p:cNvSpPr>
-            <a:spLocks noGrp="1"/>
-          </p:cNvSpPr>
-          <p:nvPr>
-            <p:ph type="title"/>
-          </p:nvPr>
-        </p:nvSpPr>
-        <p:spPr>
-          <a:xfrm>
-            <a:off x="677334" y="255270"/>
-            <a:ext cx="8596668" cy="670560"/>
-          </a:xfrm>
-        </p:spPr>
-        <p:txBody>
-          <a:bodyPr/>
-          <a:lstStyle/>
-          <a:p>
-            <a:r>
-              <a:rPr lang="en-US" dirty="0"/>
-              <a:t>Jersey Rest Service</a:t>
-            </a:r>
-          </a:p>
-        </p:txBody>
-      </p:sp>
-      <p:pic>
-        <p:nvPicPr>
-          <p:cNvPr id="4" name="Picture 3">
-            <a:extLst>
-              <a:ext uri="{FF2B5EF4-FFF2-40B4-BE49-F238E27FC236}">
-                <a16:creationId xmlns:a16="http://schemas.microsoft.com/office/drawing/2014/main" id="{D76ECB3D-19BA-4A9C-9F3F-B88C292E1973}"/>
-              </a:ext>
-            </a:extLst>
-          </p:cNvPr>
-          <p:cNvPicPr>
-            <a:picLocks noChangeAspect="1"/>
-          </p:cNvPicPr>
-          <p:nvPr/>
-        </p:nvPicPr>
-        <p:blipFill>
-          <a:blip r:embed="rId3"/>
-          <a:stretch>
-            <a:fillRect/>
-          </a:stretch>
-        </p:blipFill>
-        <p:spPr>
-          <a:xfrm>
-            <a:off x="677334" y="1508760"/>
-            <a:ext cx="7486650" cy="2971800"/>
-          </a:xfrm>
-          <a:prstGeom prst="rect">
-            <a:avLst/>
-          </a:prstGeom>
-        </p:spPr>
-      </p:pic>
-    </p:spTree>
-    <p:extLst>
-      <p:ext uri="{BB962C8B-B14F-4D97-AF65-F5344CB8AC3E}">
-        <p14:creationId xmlns:p14="http://schemas.microsoft.com/office/powerpoint/2010/main" val="2307113331"/>
-      </p:ext>
-    </p:extLst>
-  </p:cSld>
-  <p:clrMapOvr>
-    <a:masterClrMapping/>
-  </p:clrMapOvr>
-</p:sld>
-</file>
-
-<file path=ppt/slides/slide13.xml><?xml version="1.0" encoding="utf-8"?>
-<p:sld xmlns:a="http://schemas.openxmlformats.org/drawingml/2006/main" xmlns:r="http://schemas.openxmlformats.org/officeDocument/2006/relationships" xmlns:p="http://schemas.openxmlformats.org/presentationml/2006/main">
-  <p:cSld>
-    <p:spTree>
-      <p:nvGrpSpPr>
-        <p:cNvPr id="1" name=""/>
-        <p:cNvGrpSpPr/>
-        <p:nvPr/>
-      </p:nvGrpSpPr>
-      <p:grpSpPr>
-        <a:xfrm>
-          <a:off x="0" y="0"/>
-          <a:ext cx="0" cy="0"/>
-          <a:chOff x="0" y="0"/>
-          <a:chExt cx="0" cy="0"/>
-        </a:xfrm>
-      </p:grpSpPr>
-      <p:sp>
-        <p:nvSpPr>
-          <p:cNvPr id="2" name="Title 1">
-            <a:extLst>
-              <a:ext uri="{FF2B5EF4-FFF2-40B4-BE49-F238E27FC236}">
-                <a16:creationId xmlns:a16="http://schemas.microsoft.com/office/drawing/2014/main" id="{57AB5A4D-DAF8-4C96-B052-56E4C1FC4318}"/>
-              </a:ext>
-            </a:extLst>
-          </p:cNvPr>
-          <p:cNvSpPr>
-            <a:spLocks noGrp="1"/>
-          </p:cNvSpPr>
-          <p:nvPr>
-            <p:ph type="title"/>
-          </p:nvPr>
-        </p:nvSpPr>
-        <p:spPr>
-          <a:xfrm>
-            <a:off x="677334" y="255270"/>
-            <a:ext cx="8596668" cy="670560"/>
-          </a:xfrm>
-        </p:spPr>
-        <p:txBody>
-          <a:bodyPr>
-            <a:normAutofit/>
-          </a:bodyPr>
-          <a:lstStyle/>
-          <a:p>
-            <a:r>
-              <a:rPr lang="en-US" dirty="0"/>
-              <a:t>Jersey Rest Service</a:t>
-            </a:r>
-          </a:p>
-        </p:txBody>
-      </p:sp>
-      <p:pic>
-        <p:nvPicPr>
-          <p:cNvPr id="3" name="Picture 2">
-            <a:extLst>
-              <a:ext uri="{FF2B5EF4-FFF2-40B4-BE49-F238E27FC236}">
-                <a16:creationId xmlns:a16="http://schemas.microsoft.com/office/drawing/2014/main" id="{D6FFA286-FD91-46DE-9D9C-94FD8DF0245D}"/>
-              </a:ext>
-            </a:extLst>
-          </p:cNvPr>
-          <p:cNvPicPr>
-            <a:picLocks noChangeAspect="1"/>
-          </p:cNvPicPr>
-          <p:nvPr/>
-        </p:nvPicPr>
-        <p:blipFill>
-          <a:blip r:embed="rId3"/>
-          <a:stretch>
-            <a:fillRect/>
-          </a:stretch>
-        </p:blipFill>
-        <p:spPr>
-          <a:xfrm>
-            <a:off x="677334" y="1203069"/>
-            <a:ext cx="6133254" cy="2469028"/>
-          </a:xfrm>
-          <a:prstGeom prst="rect">
-            <a:avLst/>
-          </a:prstGeom>
-        </p:spPr>
-      </p:pic>
-      <p:pic>
-        <p:nvPicPr>
-          <p:cNvPr id="5" name="Picture 4">
-            <a:extLst>
-              <a:ext uri="{FF2B5EF4-FFF2-40B4-BE49-F238E27FC236}">
-                <a16:creationId xmlns:a16="http://schemas.microsoft.com/office/drawing/2014/main" id="{83B13BFC-D49D-4543-A8A0-BDFFDB4B807F}"/>
-              </a:ext>
-            </a:extLst>
-          </p:cNvPr>
-          <p:cNvPicPr>
-            <a:picLocks noChangeAspect="1"/>
-          </p:cNvPicPr>
-          <p:nvPr/>
-        </p:nvPicPr>
-        <p:blipFill>
-          <a:blip r:embed="rId4"/>
-          <a:stretch>
-            <a:fillRect/>
-          </a:stretch>
-        </p:blipFill>
-        <p:spPr>
-          <a:xfrm>
-            <a:off x="677334" y="3857896"/>
-            <a:ext cx="5996094" cy="2861039"/>
-          </a:xfrm>
-          <a:prstGeom prst="rect">
-            <a:avLst/>
-          </a:prstGeom>
-        </p:spPr>
-      </p:pic>
-      <p:sp>
-        <p:nvSpPr>
-          <p:cNvPr id="6" name="TextBox 5">
-            <a:extLst>
-              <a:ext uri="{FF2B5EF4-FFF2-40B4-BE49-F238E27FC236}">
-                <a16:creationId xmlns:a16="http://schemas.microsoft.com/office/drawing/2014/main" id="{6E8FBEA3-5100-41D2-8049-06135FE5DADC}"/>
-              </a:ext>
-            </a:extLst>
-          </p:cNvPr>
-          <p:cNvSpPr txBox="1"/>
-          <p:nvPr/>
-        </p:nvSpPr>
-        <p:spPr>
-          <a:xfrm>
-            <a:off x="7989570" y="3097530"/>
-            <a:ext cx="1284432" cy="646331"/>
-          </a:xfrm>
-          <a:prstGeom prst="rect">
-            <a:avLst/>
-          </a:prstGeom>
-          <a:noFill/>
-        </p:spPr>
-        <p:txBody>
-          <a:bodyPr wrap="square" rtlCol="0">
-            <a:spAutoFit/>
-          </a:bodyPr>
-          <a:lstStyle/>
-          <a:p>
-            <a:r>
-              <a:rPr lang="en-US" dirty="0"/>
-              <a:t>Get vs Post</a:t>
-            </a:r>
-          </a:p>
-        </p:txBody>
-      </p:sp>
-    </p:spTree>
-    <p:extLst>
-      <p:ext uri="{BB962C8B-B14F-4D97-AF65-F5344CB8AC3E}">
-        <p14:creationId xmlns:p14="http://schemas.microsoft.com/office/powerpoint/2010/main" val="1555517701"/>
-      </p:ext>
-    </p:extLst>
-  </p:cSld>
-  <p:clrMapOvr>
-    <a:masterClrMapping/>
-  </p:clrMapOvr>
-</p:sld>
-</file>
-
-<file path=ppt/slides/slide14.xml><?xml version="1.0" encoding="utf-8"?>
-<p:sld xmlns:a="http://schemas.openxmlformats.org/drawingml/2006/main" xmlns:r="http://schemas.openxmlformats.org/officeDocument/2006/relationships" xmlns:p="http://schemas.openxmlformats.org/presentationml/2006/main">
-  <p:cSld>
-    <p:spTree>
-      <p:nvGrpSpPr>
-        <p:cNvPr id="1" name=""/>
-        <p:cNvGrpSpPr/>
-        <p:nvPr/>
-      </p:nvGrpSpPr>
-      <p:grpSpPr>
-        <a:xfrm>
-          <a:off x="0" y="0"/>
-          <a:ext cx="0" cy="0"/>
-          <a:chOff x="0" y="0"/>
-          <a:chExt cx="0" cy="0"/>
-        </a:xfrm>
-      </p:grpSpPr>
-      <p:sp>
-        <p:nvSpPr>
-          <p:cNvPr id="2" name="Title 1">
-            <a:extLst>
-              <a:ext uri="{FF2B5EF4-FFF2-40B4-BE49-F238E27FC236}">
-                <a16:creationId xmlns:a16="http://schemas.microsoft.com/office/drawing/2014/main" id="{57AB5A4D-DAF8-4C96-B052-56E4C1FC4318}"/>
-              </a:ext>
-            </a:extLst>
-          </p:cNvPr>
-          <p:cNvSpPr>
-            <a:spLocks noGrp="1"/>
-          </p:cNvSpPr>
-          <p:nvPr>
-            <p:ph type="title"/>
-          </p:nvPr>
-        </p:nvSpPr>
-        <p:spPr>
-          <a:xfrm>
-            <a:off x="677334" y="255270"/>
-            <a:ext cx="8596668" cy="670560"/>
-          </a:xfrm>
-        </p:spPr>
-        <p:txBody>
-          <a:bodyPr>
-            <a:normAutofit/>
-          </a:bodyPr>
-          <a:lstStyle/>
-          <a:p>
-            <a:r>
-              <a:rPr lang="en-US" dirty="0"/>
-              <a:t>Jersey Rest Service</a:t>
-            </a:r>
-          </a:p>
-        </p:txBody>
-      </p:sp>
-      <p:sp>
-        <p:nvSpPr>
-          <p:cNvPr id="6" name="TextBox 5">
-            <a:extLst>
-              <a:ext uri="{FF2B5EF4-FFF2-40B4-BE49-F238E27FC236}">
-                <a16:creationId xmlns:a16="http://schemas.microsoft.com/office/drawing/2014/main" id="{6E8FBEA3-5100-41D2-8049-06135FE5DADC}"/>
-              </a:ext>
-            </a:extLst>
-          </p:cNvPr>
-          <p:cNvSpPr txBox="1"/>
-          <p:nvPr/>
-        </p:nvSpPr>
-        <p:spPr>
-          <a:xfrm>
-            <a:off x="7989570" y="3097530"/>
-            <a:ext cx="1284432" cy="646331"/>
-          </a:xfrm>
-          <a:prstGeom prst="rect">
-            <a:avLst/>
-          </a:prstGeom>
-          <a:noFill/>
-        </p:spPr>
-        <p:txBody>
-          <a:bodyPr wrap="square" rtlCol="0">
-            <a:spAutoFit/>
-          </a:bodyPr>
-          <a:lstStyle/>
-          <a:p>
-            <a:r>
-              <a:rPr lang="en-US" dirty="0"/>
-              <a:t>Put vs Delete</a:t>
-            </a:r>
-          </a:p>
-        </p:txBody>
-      </p:sp>
-      <p:pic>
-        <p:nvPicPr>
-          <p:cNvPr id="7" name="Picture 6">
-            <a:extLst>
-              <a:ext uri="{FF2B5EF4-FFF2-40B4-BE49-F238E27FC236}">
-                <a16:creationId xmlns:a16="http://schemas.microsoft.com/office/drawing/2014/main" id="{2A2A2564-8114-48E5-8A21-62A89FC5CAC3}"/>
-              </a:ext>
-            </a:extLst>
-          </p:cNvPr>
-          <p:cNvPicPr>
-            <a:picLocks noChangeAspect="1"/>
-          </p:cNvPicPr>
-          <p:nvPr/>
-        </p:nvPicPr>
-        <p:blipFill>
-          <a:blip r:embed="rId3"/>
-          <a:stretch>
-            <a:fillRect/>
-          </a:stretch>
-        </p:blipFill>
-        <p:spPr>
-          <a:xfrm>
-            <a:off x="349567" y="1754505"/>
-            <a:ext cx="7286625" cy="3028950"/>
-          </a:xfrm>
-          <a:prstGeom prst="rect">
-            <a:avLst/>
-          </a:prstGeom>
-        </p:spPr>
-      </p:pic>
-    </p:spTree>
-    <p:extLst>
-      <p:ext uri="{BB962C8B-B14F-4D97-AF65-F5344CB8AC3E}">
-        <p14:creationId xmlns:p14="http://schemas.microsoft.com/office/powerpoint/2010/main" val="2057883138"/>
-      </p:ext>
-    </p:extLst>
-  </p:cSld>
-  <p:clrMapOvr>
-    <a:masterClrMapping/>
-  </p:clrMapOvr>
-</p:sld>
-</file>
-
-<file path=ppt/slides/slide15.xml><?xml version="1.0" encoding="utf-8"?>
-<p:sld xmlns:a="http://schemas.openxmlformats.org/drawingml/2006/main" xmlns:r="http://schemas.openxmlformats.org/officeDocument/2006/relationships" xmlns:p="http://schemas.openxmlformats.org/presentationml/2006/main">
-  <p:cSld>
-    <p:spTree>
-      <p:nvGrpSpPr>
-        <p:cNvPr id="1" name=""/>
-        <p:cNvGrpSpPr/>
-        <p:nvPr/>
-      </p:nvGrpSpPr>
-      <p:grpSpPr>
-        <a:xfrm>
-          <a:off x="0" y="0"/>
-          <a:ext cx="0" cy="0"/>
-          <a:chOff x="0" y="0"/>
-          <a:chExt cx="0" cy="0"/>
-        </a:xfrm>
-      </p:grpSpPr>
-      <p:sp>
-        <p:nvSpPr>
-          <p:cNvPr id="2" name="Title 1">
-            <a:extLst>
-              <a:ext uri="{FF2B5EF4-FFF2-40B4-BE49-F238E27FC236}">
                 <a16:creationId xmlns:a16="http://schemas.microsoft.com/office/drawing/2014/main" id="{C7A743E7-226C-4A4F-86F3-EB9DE0DB4434}"/>
               </a:ext>
             </a:extLst>
@@ -8119,12 +7423,6 @@
             <a:r>
               <a:rPr lang="en-US" dirty="0"/>
               <a:t>JDBC</a:t>
-            </a:r>
-          </a:p>
-          <a:p>
-            <a:r>
-              <a:rPr lang="en-US" dirty="0"/>
-              <a:t>Jersey Rest Service</a:t>
             </a:r>
           </a:p>
           <a:p>
@@ -8807,8 +8105,8 @@
         </p:nvSpPr>
         <p:spPr>
           <a:xfrm>
-            <a:off x="677334" y="1108711"/>
-            <a:ext cx="8596668" cy="4932652"/>
+            <a:off x="677334" y="1108710"/>
+            <a:ext cx="8596668" cy="3589019"/>
           </a:xfrm>
         </p:spPr>
         <p:txBody>
@@ -8816,66 +8114,69 @@
           <a:lstStyle/>
           <a:p>
             <a:r>
+              <a:rPr lang="en-US" dirty="0" err="1"/>
+              <a:t>Clob</a:t>
+            </a:r>
+            <a:r>
               <a:rPr lang="en-US" dirty="0"/>
-              <a:t>Normalization vs De-normalization</a:t>
+              <a:t> vs Blob</a:t>
+            </a:r>
+          </a:p>
+          <a:p>
+            <a:r>
+              <a:rPr lang="en-US" dirty="0"/>
+              <a:t>Truncate vs Delete vs Drop</a:t>
+            </a:r>
+          </a:p>
+          <a:p>
+            <a:r>
+              <a:rPr lang="en-US" dirty="0"/>
+              <a:t>View vs Materialized View vs Table</a:t>
+            </a:r>
+          </a:p>
+          <a:p>
+            <a:r>
+              <a:rPr lang="en-US" dirty="0"/>
+              <a:t>Normalization vs De-Normalization</a:t>
             </a:r>
           </a:p>
           <a:p>
             <a:endParaRPr lang="en-US" dirty="0"/>
           </a:p>
-        </p:txBody>
-      </p:sp>
-      <p:pic>
-        <p:nvPicPr>
-          <p:cNvPr id="1026" name="Picture 2" descr="Image result for database normalization vs denormalization">
-            <a:extLst>
-              <a:ext uri="{FF2B5EF4-FFF2-40B4-BE49-F238E27FC236}">
-                <a16:creationId xmlns:a16="http://schemas.microsoft.com/office/drawing/2014/main" id="{F48772FA-CFB8-448B-9A49-4E6ACF555358}"/>
-              </a:ext>
-            </a:extLst>
-          </p:cNvPr>
-          <p:cNvPicPr>
-            <a:picLocks noChangeAspect="1" noChangeArrowheads="1"/>
-          </p:cNvPicPr>
-          <p:nvPr/>
-        </p:nvPicPr>
-        <p:blipFill>
-          <a:blip r:embed="rId3">
-            <a:extLst>
-              <a:ext uri="{28A0092B-C50C-407E-A947-70E740481C1C}">
-                <a14:useLocalDpi xmlns:a14="http://schemas.microsoft.com/office/drawing/2010/main" val="0"/>
-              </a:ext>
-            </a:extLst>
-          </a:blip>
-          <a:srcRect/>
-          <a:stretch>
-            <a:fillRect/>
-          </a:stretch>
-        </p:blipFill>
-        <p:spPr bwMode="auto">
-          <a:xfrm>
-            <a:off x="1072514" y="1748789"/>
-            <a:ext cx="6867525" cy="4767148"/>
-          </a:xfrm>
-          <a:prstGeom prst="rect">
-            <a:avLst/>
-          </a:prstGeom>
-          <a:noFill/>
-          <a:extLst>
-            <a:ext uri="{909E8E84-426E-40DD-AFC4-6F175D3DCCD1}">
-              <a14:hiddenFill xmlns:a14="http://schemas.microsoft.com/office/drawing/2010/main">
-                <a:solidFill>
-                  <a:srgbClr val="FFFFFF"/>
-                </a:solidFill>
-              </a14:hiddenFill>
-            </a:ext>
-          </a:extLst>
-        </p:spPr>
-      </p:pic>
+          <a:p>
+            <a:r>
+              <a:rPr lang="en-US" dirty="0"/>
+              <a:t>Query: Distinct, Group by, </a:t>
+            </a:r>
+            <a:r>
+              <a:rPr lang="en-US" dirty="0" err="1"/>
+              <a:t>isnull</a:t>
+            </a:r>
+            <a:r>
+              <a:rPr lang="en-US" dirty="0"/>
+              <a:t>/</a:t>
+            </a:r>
+            <a:r>
+              <a:rPr lang="en-US" dirty="0" err="1"/>
+              <a:t>nvl</a:t>
+            </a:r>
+            <a:r>
+              <a:rPr lang="en-US" dirty="0"/>
+              <a:t>, join on, Having</a:t>
+            </a:r>
+          </a:p>
+          <a:p>
+            <a:pPr marL="0" indent="0">
+              <a:buNone/>
+            </a:pPr>
+            <a:endParaRPr lang="en-US" dirty="0"/>
+          </a:p>
+        </p:txBody>
+      </p:sp>
     </p:spTree>
     <p:extLst>
       <p:ext uri="{BB962C8B-B14F-4D97-AF65-F5344CB8AC3E}">
-        <p14:creationId xmlns:p14="http://schemas.microsoft.com/office/powerpoint/2010/main" val="2107812529"/>
+        <p14:creationId xmlns:p14="http://schemas.microsoft.com/office/powerpoint/2010/main" val="61436627"/>
       </p:ext>
     </p:extLst>
   </p:cSld>
@@ -8953,66 +8254,137 @@
         </p:nvSpPr>
         <p:spPr>
           <a:xfrm>
-            <a:off x="677334" y="1108710"/>
-            <a:ext cx="8596668" cy="3589019"/>
+            <a:off x="677334" y="1295523"/>
+            <a:ext cx="7581763" cy="5334000"/>
           </a:xfrm>
         </p:spPr>
         <p:txBody>
-          <a:bodyPr/>
-          <a:lstStyle/>
-          <a:p>
-            <a:r>
-              <a:rPr lang="en-US" dirty="0" err="1"/>
-              <a:t>Clob</a:t>
-            </a:r>
-            <a:r>
-              <a:rPr lang="en-US" dirty="0"/>
-              <a:t> vs Blob</a:t>
-            </a:r>
-          </a:p>
-          <a:p>
-            <a:r>
-              <a:rPr lang="en-US" dirty="0"/>
-              <a:t>Truncate vs Delete vs Drop</a:t>
-            </a:r>
-          </a:p>
-          <a:p>
-            <a:r>
-              <a:rPr lang="en-US" dirty="0"/>
-              <a:t>View vs </a:t>
-            </a:r>
-            <a:r>
-              <a:rPr lang="en-US" dirty="0" err="1"/>
-              <a:t>Materalized</a:t>
-            </a:r>
-            <a:r>
-              <a:rPr lang="en-US" dirty="0"/>
-              <a:t> View vs Table</a:t>
-            </a:r>
-          </a:p>
+          <a:bodyPr>
+            <a:normAutofit lnSpcReduction="10000"/>
+          </a:bodyPr>
+          <a:lstStyle/>
           <a:p>
             <a:pPr marL="0" indent="0">
               <a:buNone/>
             </a:pPr>
-            <a:endParaRPr lang="en-US" dirty="0"/>
-          </a:p>
-          <a:p>
-            <a:r>
-              <a:rPr lang="en-US" dirty="0">
-                <a:hlinkClick r:id="rId3"/>
-              </a:rPr>
-              <a:t>https://artoftesting.com/interviewSection/sql-queries-for-interview.html</a:t>
-            </a:r>
-            <a:endParaRPr lang="en-US" dirty="0"/>
+            <a:r>
+              <a:rPr lang="en-US" sz="1600" u="sng" dirty="0"/>
+              <a:t>Use MySQL to build employee and salary table and solve the followings:</a:t>
+            </a:r>
+          </a:p>
+          <a:p>
+            <a:pPr marL="0" indent="0">
+              <a:buNone/>
+            </a:pPr>
+            <a:endParaRPr lang="en-US" sz="1600" dirty="0"/>
+          </a:p>
+          <a:p>
+            <a:pPr marL="0" indent="0">
+              <a:buNone/>
+            </a:pPr>
+            <a:r>
+              <a:rPr lang="en-US" sz="1600" dirty="0"/>
+              <a:t>1. fetch the count of employees working in project 'P1'.</a:t>
+            </a:r>
+          </a:p>
+          <a:p>
+            <a:pPr marL="0" indent="0">
+              <a:buNone/>
+            </a:pPr>
+            <a:r>
+              <a:rPr lang="en-US" sz="1600" dirty="0"/>
+              <a:t>2. fetch employee names having salary greater than or equal to 5000 and less than or equal 10000.</a:t>
+            </a:r>
+          </a:p>
+          <a:p>
+            <a:pPr marL="0" indent="0">
+              <a:buNone/>
+            </a:pPr>
+            <a:r>
+              <a:rPr lang="en-US" sz="1600" dirty="0"/>
+              <a:t>3. fetch project-wise count of employees sorted by project's count in descending order.</a:t>
+            </a:r>
+          </a:p>
+          <a:p>
+            <a:pPr marL="0" indent="0">
+              <a:buNone/>
+            </a:pPr>
+            <a:r>
+              <a:rPr lang="en-US" sz="1600" dirty="0"/>
+              <a:t>4. fetch projects that include more than 1 employees</a:t>
+            </a:r>
+          </a:p>
+          <a:p>
+            <a:pPr marL="0" indent="0">
+              <a:buNone/>
+            </a:pPr>
+            <a:r>
+              <a:rPr lang="en-US" sz="1600" dirty="0"/>
+              <a:t>5. fetch employee names and salary, if employee does not have salary, show salary as 0.</a:t>
+            </a:r>
+          </a:p>
+          <a:p>
+            <a:pPr marL="0" indent="0">
+              <a:buNone/>
+            </a:pPr>
+            <a:r>
+              <a:rPr lang="en-US" sz="1600" dirty="0"/>
+              <a:t>6. fetch all employees whose managers are also in the employee table</a:t>
+            </a:r>
+          </a:p>
+          <a:p>
+            <a:pPr marL="0" indent="0">
+              <a:buNone/>
+            </a:pPr>
+            <a:r>
+              <a:rPr lang="en-US" sz="1600" dirty="0"/>
+              <a:t>7. fetch duplicate employee name in the employee table</a:t>
+            </a:r>
+          </a:p>
+          <a:p>
+            <a:pPr marL="0" indent="0">
+              <a:buNone/>
+            </a:pPr>
+            <a:r>
+              <a:rPr lang="en-US" sz="1600" dirty="0"/>
+              <a:t>8. fetch employees who do not have salary</a:t>
+            </a:r>
+          </a:p>
+          <a:p>
+            <a:pPr marL="0" indent="0">
+              <a:buNone/>
+            </a:pPr>
+            <a:r>
+              <a:rPr lang="en-US" sz="1600" dirty="0"/>
+              <a:t>9. fetch current date and current timestamp</a:t>
+            </a:r>
+          </a:p>
+          <a:p>
+            <a:pPr marL="0" indent="0">
+              <a:buNone/>
+            </a:pPr>
+            <a:r>
+              <a:rPr lang="en-US" sz="1600" dirty="0"/>
+              <a:t>10.fetch employee who joined in year 2016</a:t>
+            </a:r>
+          </a:p>
+          <a:p>
+            <a:pPr marL="0" indent="0">
+              <a:buNone/>
+            </a:pPr>
+            <a:r>
+              <a:rPr lang="en-US" sz="1600" dirty="0"/>
+              <a:t>11.fetch employees and their salary who joined in "January"</a:t>
+            </a:r>
           </a:p>
         </p:txBody>
       </p:sp>
       <p:pic>
         <p:nvPicPr>
-          <p:cNvPr id="4" name="Picture 3">
+          <p:cNvPr id="6" name="Picture 5">
             <a:extLst>
               <a:ext uri="{FF2B5EF4-FFF2-40B4-BE49-F238E27FC236}">
-                <a16:creationId xmlns:a16="http://schemas.microsoft.com/office/drawing/2014/main" id="{8D552F5A-D391-4C07-9DA0-B6E7875CE2AB}"/>
+                <a16:creationId xmlns:a16="http://schemas.microsoft.com/office/drawing/2014/main" id="{525D6CC1-D7DF-438B-A33E-9319A54F650B}"/>
               </a:ext>
             </a:extLst>
           </p:cNvPr>
@@ -9022,15 +8394,15 @@
           <p:nvPr/>
         </p:nvPicPr>
         <p:blipFill>
-          <a:blip r:embed="rId4"/>
+          <a:blip r:embed="rId3"/>
           <a:stretch>
             <a:fillRect/>
           </a:stretch>
         </p:blipFill>
         <p:spPr>
           <a:xfrm>
-            <a:off x="934402" y="3623310"/>
-            <a:ext cx="7077075" cy="2819400"/>
+            <a:off x="8802329" y="1585912"/>
+            <a:ext cx="3200400" cy="3686175"/>
           </a:xfrm>
           <a:prstGeom prst="rect">
             <a:avLst/>
@@ -9040,7 +8412,7 @@
     </p:spTree>
     <p:extLst>
       <p:ext uri="{BB962C8B-B14F-4D97-AF65-F5344CB8AC3E}">
-        <p14:creationId xmlns:p14="http://schemas.microsoft.com/office/powerpoint/2010/main" val="61436627"/>
+        <p14:creationId xmlns:p14="http://schemas.microsoft.com/office/powerpoint/2010/main" val="2595196863"/>
       </p:ext>
     </p:extLst>
   </p:cSld>
@@ -9855,7 +9227,7 @@
           <p:cNvPr id="2" name="Title 1">
             <a:extLst>
               <a:ext uri="{FF2B5EF4-FFF2-40B4-BE49-F238E27FC236}">
-                <a16:creationId xmlns:a16="http://schemas.microsoft.com/office/drawing/2014/main" id="{BE390FF4-8533-43FA-A763-009A21867D96}"/>
+                <a16:creationId xmlns:a16="http://schemas.microsoft.com/office/drawing/2014/main" id="{854F950B-AEEC-4409-A257-6294E5A431FF}"/>
               </a:ext>
             </a:extLst>
           </p:cNvPr>
@@ -9869,7 +9241,7 @@
         <p:spPr>
           <a:xfrm>
             <a:off x="677334" y="609600"/>
-            <a:ext cx="8596668" cy="786714"/>
+            <a:ext cx="8596668" cy="739140"/>
           </a:xfrm>
         </p:spPr>
         <p:txBody>
@@ -9878,7 +9250,7 @@
           <a:p>
             <a:r>
               <a:rPr lang="en-US" dirty="0"/>
-              <a:t>MongoDB vs Cassandra</a:t>
+              <a:t>Git rebase vs merge</a:t>
             </a:r>
           </a:p>
         </p:txBody>
@@ -9888,7 +9260,7 @@
           <p:cNvPr id="3" name="Content Placeholder 2">
             <a:extLst>
               <a:ext uri="{FF2B5EF4-FFF2-40B4-BE49-F238E27FC236}">
-                <a16:creationId xmlns:a16="http://schemas.microsoft.com/office/drawing/2014/main" id="{6F3306F2-A95F-45CF-A4AE-2D4598735AE8}"/>
+                <a16:creationId xmlns:a16="http://schemas.microsoft.com/office/drawing/2014/main" id="{04F20373-0BFF-4C35-8463-E52FFE3EA21D}"/>
               </a:ext>
             </a:extLst>
           </p:cNvPr>
@@ -9901,154 +9273,177 @@
         </p:nvSpPr>
         <p:spPr>
           <a:xfrm>
-            <a:off x="677333" y="1488613"/>
-            <a:ext cx="10307823" cy="4759787"/>
+            <a:off x="677333" y="1440181"/>
+            <a:ext cx="8596667" cy="739141"/>
           </a:xfrm>
         </p:spPr>
         <p:txBody>
-          <a:bodyPr/>
+          <a:bodyPr>
+            <a:normAutofit lnSpcReduction="10000"/>
+          </a:bodyPr>
           <a:lstStyle/>
           <a:p>
             <a:r>
               <a:rPr lang="en-US" dirty="0"/>
-              <a:t>NoSQL vs SQL -&gt; which one to choose?</a:t>
-            </a:r>
-          </a:p>
-          <a:p>
-            <a:pPr lvl="1"/>
+              <a:t>Git </a:t>
+            </a:r>
+            <a:r>
+              <a:rPr lang="en-US" dirty="0" err="1"/>
+              <a:t>init</a:t>
+            </a:r>
             <a:r>
               <a:rPr lang="en-US" dirty="0"/>
-              <a:t>NoSQL -&gt; document/column based </a:t>
-            </a:r>
-            <a:r>
-              <a:rPr lang="en-US" dirty="0">
-                <a:solidFill>
-                  <a:srgbClr val="FF0000"/>
-                </a:solidFill>
-              </a:rPr>
-              <a:t>UNSTRUCTURED</a:t>
-            </a:r>
+              <a:t>, clone, pull, branch, checkout, add, commit, push, log</a:t>
+            </a:r>
+          </a:p>
+          <a:p>
             <a:r>
               <a:rPr lang="en-US" dirty="0"/>
-              <a:t> data</a:t>
-            </a:r>
-          </a:p>
-          <a:p>
-            <a:pPr lvl="1"/>
-            <a:r>
-              <a:rPr lang="en-US" dirty="0"/>
-              <a:t>NoSQL :</a:t>
-            </a:r>
-          </a:p>
-          <a:p>
-            <a:pPr lvl="2"/>
-            <a:r>
-              <a:rPr lang="en-US" dirty="0"/>
-              <a:t>1. NoSQL is good at handling unstructured data, large amount of documents</a:t>
-            </a:r>
-          </a:p>
-          <a:p>
-            <a:pPr lvl="2"/>
-            <a:r>
-              <a:rPr lang="en-US" dirty="0"/>
-              <a:t>2. NoSQL is not ideal for </a:t>
-            </a:r>
-            <a:r>
-              <a:rPr lang="en-US" dirty="0">
-                <a:solidFill>
-                  <a:srgbClr val="FF0000"/>
-                </a:solidFill>
-              </a:rPr>
-              <a:t>transaction</a:t>
-            </a:r>
-            <a:r>
-              <a:rPr lang="en-US" dirty="0"/>
-              <a:t> handling – not good for accounting related data</a:t>
-            </a:r>
-          </a:p>
-          <a:p>
-            <a:pPr marL="1371600" lvl="3" indent="0">
-              <a:buNone/>
-            </a:pPr>
-            <a:r>
-              <a:rPr lang="en-US" dirty="0"/>
-              <a:t>ACID – Atomicity, Consistency, Isolation, Durability</a:t>
-            </a:r>
-          </a:p>
-          <a:p>
-            <a:pPr marL="1371600" lvl="3" indent="0">
+              <a:t>Git rebase, merge</a:t>
+            </a:r>
+          </a:p>
+          <a:p>
+            <a:pPr marL="0" indent="0">
               <a:buNone/>
             </a:pPr>
             <a:endParaRPr lang="en-US" dirty="0"/>
           </a:p>
-          <a:p>
-            <a:pPr lvl="1"/>
-            <a:r>
-              <a:rPr lang="en-US" dirty="0"/>
-              <a:t>Common NoSQL </a:t>
-            </a:r>
-            <a:r>
-              <a:rPr lang="en-US" dirty="0" err="1"/>
-              <a:t>db</a:t>
-            </a:r>
-            <a:r>
-              <a:rPr lang="en-US" dirty="0"/>
-              <a:t> to learn: MongoDB, </a:t>
-            </a:r>
-            <a:r>
-              <a:rPr lang="en-US" b="1" dirty="0"/>
-              <a:t>Cassandra</a:t>
-            </a:r>
-            <a:r>
-              <a:rPr lang="en-US" dirty="0"/>
-              <a:t>, Couchbase, Redis</a:t>
-            </a:r>
-          </a:p>
-          <a:p>
-            <a:pPr lvl="1"/>
-            <a:r>
-              <a:rPr lang="en-US" dirty="0"/>
-              <a:t>NoSQL CAP theorem</a:t>
-            </a:r>
-          </a:p>
-          <a:p>
-            <a:pPr lvl="2"/>
-            <a:r>
-              <a:rPr lang="en-US" b="1" dirty="0"/>
-              <a:t>C</a:t>
-            </a:r>
-            <a:r>
-              <a:rPr lang="en-US" dirty="0"/>
-              <a:t>onsistency – data are equivalent to all requests regardless of which server the requests are sent to</a:t>
-            </a:r>
-          </a:p>
-          <a:p>
-            <a:pPr lvl="2"/>
-            <a:r>
-              <a:rPr lang="en-US" b="1" dirty="0"/>
-              <a:t>A</a:t>
-            </a:r>
-            <a:r>
-              <a:rPr lang="en-US" dirty="0"/>
-              <a:t>vailability – System will always responds to a request even with old data</a:t>
-            </a:r>
-          </a:p>
-          <a:p>
-            <a:pPr lvl="2"/>
-            <a:r>
-              <a:rPr lang="en-US" b="1" dirty="0"/>
-              <a:t>P</a:t>
-            </a:r>
-            <a:r>
-              <a:rPr lang="en-US" dirty="0"/>
-              <a:t>artition Tolerance – even if one partition fails, it won’t affect the system and requests</a:t>
-            </a:r>
-          </a:p>
-          <a:p>
-            <a:pPr lvl="1"/>
-            <a:r>
-              <a:rPr lang="en-US" dirty="0"/>
-              <a:t>MongoDB vs Cassandra</a:t>
+        </p:txBody>
+      </p:sp>
+      <p:pic>
+        <p:nvPicPr>
+          <p:cNvPr id="5" name="Picture 4">
+            <a:extLst>
+              <a:ext uri="{FF2B5EF4-FFF2-40B4-BE49-F238E27FC236}">
+                <a16:creationId xmlns:a16="http://schemas.microsoft.com/office/drawing/2014/main" id="{A40489BD-B46F-456A-84DA-478A63344E72}"/>
+              </a:ext>
+            </a:extLst>
+          </p:cNvPr>
+          <p:cNvPicPr>
+            <a:picLocks noChangeAspect="1"/>
+          </p:cNvPicPr>
+          <p:nvPr/>
+        </p:nvPicPr>
+        <p:blipFill>
+          <a:blip r:embed="rId3"/>
+          <a:stretch>
+            <a:fillRect/>
+          </a:stretch>
+        </p:blipFill>
+        <p:spPr>
+          <a:xfrm>
+            <a:off x="1913023" y="2179322"/>
+            <a:ext cx="2676525" cy="4295775"/>
+          </a:xfrm>
+          <a:prstGeom prst="rect">
+            <a:avLst/>
+          </a:prstGeom>
+        </p:spPr>
+      </p:pic>
+      <p:pic>
+        <p:nvPicPr>
+          <p:cNvPr id="6" name="Picture 5">
+            <a:extLst>
+              <a:ext uri="{FF2B5EF4-FFF2-40B4-BE49-F238E27FC236}">
+                <a16:creationId xmlns:a16="http://schemas.microsoft.com/office/drawing/2014/main" id="{06E97FB3-4FC2-4C80-8758-F45E885B0888}"/>
+              </a:ext>
+            </a:extLst>
+          </p:cNvPr>
+          <p:cNvPicPr>
+            <a:picLocks noChangeAspect="1"/>
+          </p:cNvPicPr>
+          <p:nvPr/>
+        </p:nvPicPr>
+        <p:blipFill>
+          <a:blip r:embed="rId4"/>
+          <a:stretch>
+            <a:fillRect/>
+          </a:stretch>
+        </p:blipFill>
+        <p:spPr>
+          <a:xfrm>
+            <a:off x="6955947" y="2270763"/>
+            <a:ext cx="2158606" cy="4241205"/>
+          </a:xfrm>
+          <a:prstGeom prst="rect">
+            <a:avLst/>
+          </a:prstGeom>
+        </p:spPr>
+      </p:pic>
+      <p:sp>
+        <p:nvSpPr>
+          <p:cNvPr id="7" name="TextBox 6">
+            <a:extLst>
+              <a:ext uri="{FF2B5EF4-FFF2-40B4-BE49-F238E27FC236}">
+                <a16:creationId xmlns:a16="http://schemas.microsoft.com/office/drawing/2014/main" id="{4F557597-CCE1-467C-9940-B9ED7BD3E9F3}"/>
+              </a:ext>
+            </a:extLst>
+          </p:cNvPr>
+          <p:cNvSpPr txBox="1"/>
+          <p:nvPr/>
+        </p:nvSpPr>
+        <p:spPr>
+          <a:xfrm>
+            <a:off x="3251285" y="5948516"/>
+            <a:ext cx="1138425" cy="369332"/>
+          </a:xfrm>
+          <a:prstGeom prst="rect">
+            <a:avLst/>
+          </a:prstGeom>
+          <a:noFill/>
+        </p:spPr>
+        <p:txBody>
+          <a:bodyPr wrap="square" rtlCol="0">
+            <a:spAutoFit/>
+          </a:bodyPr>
+          <a:lstStyle/>
+          <a:p>
+            <a:r>
+              <a:rPr lang="en-US" b="1" dirty="0">
+                <a:highlight>
+                  <a:srgbClr val="FFFF00"/>
+                </a:highlight>
+              </a:rPr>
+              <a:t>merge</a:t>
+            </a:r>
+          </a:p>
+        </p:txBody>
+      </p:sp>
+      <p:sp>
+        <p:nvSpPr>
+          <p:cNvPr id="10" name="TextBox 9">
+            <a:extLst>
+              <a:ext uri="{FF2B5EF4-FFF2-40B4-BE49-F238E27FC236}">
+                <a16:creationId xmlns:a16="http://schemas.microsoft.com/office/drawing/2014/main" id="{05BBDCA5-ADBA-44E0-A227-BFF9B0BFD13B}"/>
+              </a:ext>
+            </a:extLst>
+          </p:cNvPr>
+          <p:cNvSpPr txBox="1"/>
+          <p:nvPr/>
+        </p:nvSpPr>
+        <p:spPr>
+          <a:xfrm>
+            <a:off x="6955947" y="5948516"/>
+            <a:ext cx="1138425" cy="369332"/>
+          </a:xfrm>
+          <a:prstGeom prst="rect">
+            <a:avLst/>
+          </a:prstGeom>
+          <a:noFill/>
+        </p:spPr>
+        <p:txBody>
+          <a:bodyPr wrap="square" rtlCol="0">
+            <a:spAutoFit/>
+          </a:bodyPr>
+          <a:lstStyle/>
+          <a:p>
+            <a:r>
+              <a:rPr lang="en-US" b="1" dirty="0">
+                <a:highlight>
+                  <a:srgbClr val="FFFF00"/>
+                </a:highlight>
+              </a:rPr>
+              <a:t>rebase</a:t>
             </a:r>
           </a:p>
         </p:txBody>
@@ -10056,7 +9451,7 @@
     </p:spTree>
     <p:extLst>
       <p:ext uri="{BB962C8B-B14F-4D97-AF65-F5344CB8AC3E}">
-        <p14:creationId xmlns:p14="http://schemas.microsoft.com/office/powerpoint/2010/main" val="1594281675"/>
+        <p14:creationId xmlns:p14="http://schemas.microsoft.com/office/powerpoint/2010/main" val="3559644683"/>
       </p:ext>
     </p:extLst>
   </p:cSld>

</xml_diff>